<commit_message>
added updated diagram pdf
</commit_message>
<xml_diff>
--- a/docs/gfx_ppt.pptx
+++ b/docs/gfx_ppt.pptx
@@ -11,8 +11,9 @@
     <p:sldId id="263" r:id="rId5"/>
     <p:sldId id="259" r:id="rId6"/>
     <p:sldId id="260" r:id="rId7"/>
-    <p:sldId id="261" r:id="rId8"/>
-    <p:sldId id="262" r:id="rId9"/>
+    <p:sldId id="264" r:id="rId8"/>
+    <p:sldId id="261" r:id="rId9"/>
+    <p:sldId id="262" r:id="rId10"/>
   </p:sldIdLst>
   <p:sldSz cx="9144000" cy="6858000" type="screen4x3"/>
   <p:notesSz cx="6858000" cy="9144000"/>
@@ -174,7 +175,7 @@
             <a:fld id="{2233D26B-DFC2-4248-8ED0-AD3E108CBDD7}" type="datetime1">
               <a:rPr lang="en-US" smtClean="0"/>
               <a:pPr/>
-              <a:t>12/10/14</a:t>
+              <a:t>12/11/14</a:t>
             </a:fld>
             <a:endParaRPr lang="en-US"/>
           </a:p>
@@ -492,7 +493,7 @@
             <a:fld id="{E694C003-38E8-486A-9BFD-47E55D87241C}" type="datetime1">
               <a:rPr lang="en-US" smtClean="0"/>
               <a:pPr/>
-              <a:t>12/10/14</a:t>
+              <a:t>12/11/14</a:t>
             </a:fld>
             <a:endParaRPr lang="en-US"/>
           </a:p>
@@ -669,7 +670,7 @@
             <a:fld id="{E059EAA3-934B-41DB-B3B1-806F4BE5CC37}" type="datetime1">
               <a:rPr lang="en-US" smtClean="0"/>
               <a:pPr/>
-              <a:t>12/10/14</a:t>
+              <a:t>12/11/14</a:t>
             </a:fld>
             <a:endParaRPr lang="en-US"/>
           </a:p>
@@ -789,7 +790,7 @@
             <a:fld id="{8F97F932-D99A-4087-BFB1-EA42FAFC8D2C}" type="datetime1">
               <a:rPr lang="en-US" smtClean="0"/>
               <a:pPr/>
-              <a:t>12/10/14</a:t>
+              <a:t>12/11/14</a:t>
             </a:fld>
             <a:endParaRPr lang="en-US"/>
           </a:p>
@@ -1089,7 +1090,7 @@
             <a:fld id="{79C96367-2F2B-4F6E-ACF4-15FA13738E10}" type="datetime1">
               <a:rPr lang="en-US" smtClean="0"/>
               <a:pPr/>
-              <a:t>12/10/14</a:t>
+              <a:t>12/11/14</a:t>
             </a:fld>
             <a:endParaRPr lang="en-US"/>
           </a:p>
@@ -1384,7 +1385,7 @@
             <a:fld id="{8FB3498D-21C7-408B-8EF5-5B55DEF0BFD5}" type="datetime1">
               <a:rPr lang="en-US" smtClean="0"/>
               <a:pPr/>
-              <a:t>12/10/14</a:t>
+              <a:t>12/11/14</a:t>
             </a:fld>
             <a:endParaRPr lang="en-US"/>
           </a:p>
@@ -1814,7 +1815,7 @@
             <a:fld id="{84DB246E-8FD1-42FF-94A4-E4133095C37A}" type="datetime1">
               <a:rPr lang="en-US" smtClean="0"/>
               <a:pPr/>
-              <a:t>12/10/14</a:t>
+              <a:t>12/11/14</a:t>
             </a:fld>
             <a:endParaRPr lang="en-US"/>
           </a:p>
@@ -1934,7 +1935,7 @@
             <a:fld id="{A93939D4-B818-4372-B1EE-7CB6D5BBC74A}" type="datetime1">
               <a:rPr lang="en-US" smtClean="0"/>
               <a:pPr/>
-              <a:t>12/10/14</a:t>
+              <a:t>12/11/14</a:t>
             </a:fld>
             <a:endParaRPr lang="en-US"/>
           </a:p>
@@ -2026,7 +2027,7 @@
             <a:fld id="{2F35E438-4D0D-4834-B658-A90420491D98}" type="datetime1">
               <a:rPr lang="en-US" smtClean="0"/>
               <a:pPr/>
-              <a:t>12/10/14</a:t>
+              <a:t>12/11/14</a:t>
             </a:fld>
             <a:endParaRPr lang="en-US"/>
           </a:p>
@@ -2278,7 +2279,7 @@
             <a:fld id="{76F8ADFA-7142-4015-85E6-1712F15FA709}" type="datetime1">
               <a:rPr lang="en-US" smtClean="0"/>
               <a:pPr/>
-              <a:t>12/10/14</a:t>
+              <a:t>12/11/14</a:t>
             </a:fld>
             <a:endParaRPr lang="en-US"/>
           </a:p>
@@ -2796,7 +2797,7 @@
             <a:fld id="{34A581E0-D653-4D78-A48F-41D80498BC7E}" type="datetime1">
               <a:rPr lang="en-US" smtClean="0"/>
               <a:pPr/>
-              <a:t>12/10/14</a:t>
+              <a:t>12/11/14</a:t>
             </a:fld>
             <a:endParaRPr lang="en-US"/>
           </a:p>
@@ -3028,7 +3029,7 @@
             <a:fld id="{8B3AFFF1-9C47-49F0-AE12-AF188F3F4E82}" type="datetime1">
               <a:rPr lang="en-US" smtClean="0"/>
               <a:pPr/>
-              <a:t>12/10/14</a:t>
+              <a:t>12/11/14</a:t>
             </a:fld>
             <a:endParaRPr lang="en-US" dirty="0"/>
           </a:p>
@@ -3631,6 +3632,81 @@
           <a:chExt cx="0" cy="0"/>
         </a:xfrm>
       </p:grpSpPr>
+      <p:pic>
+        <p:nvPicPr>
+          <p:cNvPr id="6" name="Content Placeholder 5" descr="Screenshot 2014-12-11 08.15.01.png"/>
+          <p:cNvPicPr>
+            <a:picLocks noGrp="1" noChangeAspect="1"/>
+          </p:cNvPicPr>
+          <p:nvPr>
+            <p:ph sz="quarter" idx="13"/>
+          </p:nvPr>
+        </p:nvPicPr>
+        <p:blipFill>
+          <a:blip r:embed="rId2" cstate="print">
+            <a:extLst>
+              <a:ext uri="{28A0092B-C50C-407E-A947-70E740481C1C}">
+                <a14:useLocalDpi xmlns:a14="http://schemas.microsoft.com/office/drawing/2010/main" val="0"/>
+              </a:ext>
+            </a:extLst>
+          </a:blip>
+          <a:srcRect l="4767" r="4767"/>
+          <a:stretch>
+            <a:fillRect/>
+          </a:stretch>
+        </p:blipFill>
+        <p:spPr/>
+      </p:pic>
+      <p:sp>
+        <p:nvSpPr>
+          <p:cNvPr id="8" name="Content Placeholder 7"/>
+          <p:cNvSpPr>
+            <a:spLocks noGrp="1"/>
+          </p:cNvSpPr>
+          <p:nvPr>
+            <p:ph sz="quarter" idx="14"/>
+          </p:nvPr>
+        </p:nvSpPr>
+        <p:spPr/>
+        <p:txBody>
+          <a:bodyPr/>
+          <a:lstStyle/>
+          <a:p>
+            <a:r>
+              <a:rPr lang="en-US" dirty="0" smtClean="0"/>
+              <a:t>Planetary system simulator</a:t>
+            </a:r>
+          </a:p>
+          <a:p>
+            <a:endParaRPr lang="en-US" dirty="0"/>
+          </a:p>
+          <a:p>
+            <a:r>
+              <a:rPr lang="en-US" dirty="0" smtClean="0"/>
+              <a:t>2 View Options</a:t>
+            </a:r>
+          </a:p>
+          <a:p>
+            <a:pPr lvl="1"/>
+            <a:r>
+              <a:rPr lang="en-US" dirty="0" smtClean="0"/>
+              <a:t>Ship Camera</a:t>
+            </a:r>
+          </a:p>
+          <a:p>
+            <a:pPr lvl="1"/>
+            <a:r>
+              <a:rPr lang="en-US" dirty="0" smtClean="0"/>
+              <a:t>Planet Follower</a:t>
+            </a:r>
+            <a:endParaRPr lang="en-US" dirty="0"/>
+          </a:p>
+          <a:p>
+            <a:pPr lvl="1"/>
+            <a:endParaRPr lang="en-US" dirty="0"/>
+          </a:p>
+        </p:txBody>
+      </p:sp>
       <p:sp>
         <p:nvSpPr>
           <p:cNvPr id="2" name="Title 1"/>
@@ -3650,25 +3726,6 @@
               <a:rPr lang="en-US" dirty="0" smtClean="0"/>
               <a:t>Overview</a:t>
             </a:r>
-            <a:endParaRPr lang="en-US" dirty="0"/>
-          </a:p>
-        </p:txBody>
-      </p:sp>
-      <p:sp>
-        <p:nvSpPr>
-          <p:cNvPr id="3" name="Content Placeholder 2"/>
-          <p:cNvSpPr>
-            <a:spLocks noGrp="1"/>
-          </p:cNvSpPr>
-          <p:nvPr>
-            <p:ph sz="quarter" idx="13"/>
-          </p:nvPr>
-        </p:nvSpPr>
-        <p:spPr/>
-        <p:txBody>
-          <a:bodyPr/>
-          <a:lstStyle/>
-          <a:p>
             <a:endParaRPr lang="en-US" dirty="0"/>
           </a:p>
         </p:txBody>
@@ -3705,6 +3762,48 @@
       </p:grpSpPr>
       <p:sp>
         <p:nvSpPr>
+          <p:cNvPr id="4" name="Content Placeholder 3"/>
+          <p:cNvSpPr>
+            <a:spLocks noGrp="1"/>
+          </p:cNvSpPr>
+          <p:nvPr>
+            <p:ph sz="quarter" idx="13"/>
+          </p:nvPr>
+        </p:nvSpPr>
+        <p:spPr/>
+        <p:txBody>
+          <a:bodyPr/>
+          <a:lstStyle/>
+          <a:p>
+            <a:r>
+              <a:rPr lang="en-US" dirty="0" smtClean="0"/>
+              <a:t>2D drawn on top of 3D scene</a:t>
+            </a:r>
+            <a:endParaRPr lang="en-US" dirty="0"/>
+          </a:p>
+        </p:txBody>
+      </p:sp>
+      <p:sp>
+        <p:nvSpPr>
+          <p:cNvPr id="5" name="Content Placeholder 4"/>
+          <p:cNvSpPr>
+            <a:spLocks noGrp="1"/>
+          </p:cNvSpPr>
+          <p:nvPr>
+            <p:ph sz="quarter" idx="14"/>
+          </p:nvPr>
+        </p:nvSpPr>
+        <p:spPr/>
+        <p:txBody>
+          <a:bodyPr/>
+          <a:lstStyle/>
+          <a:p>
+            <a:endParaRPr lang="en-US"/>
+          </a:p>
+        </p:txBody>
+      </p:sp>
+      <p:sp>
+        <p:nvSpPr>
           <p:cNvPr id="2" name="Title 1"/>
           <p:cNvSpPr>
             <a:spLocks noGrp="1"/>
@@ -3722,25 +3821,6 @@
               <a:rPr lang="en-US" dirty="0" smtClean="0"/>
               <a:t>UI</a:t>
             </a:r>
-            <a:endParaRPr lang="en-US" dirty="0"/>
-          </a:p>
-        </p:txBody>
-      </p:sp>
-      <p:sp>
-        <p:nvSpPr>
-          <p:cNvPr id="3" name="Content Placeholder 2"/>
-          <p:cNvSpPr>
-            <a:spLocks noGrp="1"/>
-          </p:cNvSpPr>
-          <p:nvPr>
-            <p:ph sz="quarter" idx="13"/>
-          </p:nvPr>
-        </p:nvSpPr>
-        <p:spPr/>
-        <p:txBody>
-          <a:bodyPr/>
-          <a:lstStyle/>
-          <a:p>
             <a:endParaRPr lang="en-US" dirty="0"/>
           </a:p>
         </p:txBody>
@@ -3777,6 +3857,44 @@
       </p:grpSpPr>
       <p:sp>
         <p:nvSpPr>
+          <p:cNvPr id="4" name="Content Placeholder 3"/>
+          <p:cNvSpPr>
+            <a:spLocks noGrp="1"/>
+          </p:cNvSpPr>
+          <p:nvPr>
+            <p:ph sz="quarter" idx="13"/>
+          </p:nvPr>
+        </p:nvSpPr>
+        <p:spPr/>
+        <p:txBody>
+          <a:bodyPr/>
+          <a:lstStyle/>
+          <a:p>
+            <a:endParaRPr lang="en-US"/>
+          </a:p>
+        </p:txBody>
+      </p:sp>
+      <p:sp>
+        <p:nvSpPr>
+          <p:cNvPr id="5" name="Content Placeholder 4"/>
+          <p:cNvSpPr>
+            <a:spLocks noGrp="1"/>
+          </p:cNvSpPr>
+          <p:nvPr>
+            <p:ph sz="quarter" idx="14"/>
+          </p:nvPr>
+        </p:nvSpPr>
+        <p:spPr/>
+        <p:txBody>
+          <a:bodyPr/>
+          <a:lstStyle/>
+          <a:p>
+            <a:endParaRPr lang="en-US"/>
+          </a:p>
+        </p:txBody>
+      </p:sp>
+      <p:sp>
+        <p:nvSpPr>
           <p:cNvPr id="2" name="Title 1"/>
           <p:cNvSpPr>
             <a:spLocks noGrp="1"/>
@@ -3794,25 +3912,6 @@
               <a:rPr lang="en-US" dirty="0" smtClean="0"/>
               <a:t>Camera</a:t>
             </a:r>
-            <a:endParaRPr lang="en-US" dirty="0"/>
-          </a:p>
-        </p:txBody>
-      </p:sp>
-      <p:sp>
-        <p:nvSpPr>
-          <p:cNvPr id="3" name="Content Placeholder 2"/>
-          <p:cNvSpPr>
-            <a:spLocks noGrp="1"/>
-          </p:cNvSpPr>
-          <p:nvPr>
-            <p:ph sz="quarter" idx="13"/>
-          </p:nvPr>
-        </p:nvSpPr>
-        <p:spPr/>
-        <p:txBody>
-          <a:bodyPr/>
-          <a:lstStyle/>
-          <a:p>
             <a:endParaRPr lang="en-US" dirty="0"/>
           </a:p>
         </p:txBody>
@@ -3885,7 +3984,11 @@
           <a:bodyPr/>
           <a:lstStyle/>
           <a:p>
-            <a:endParaRPr lang="en-US"/>
+            <a:r>
+              <a:rPr lang="en-US" dirty="0" smtClean="0"/>
+              <a:t>Handled separately from the rendering loop</a:t>
+            </a:r>
+            <a:endParaRPr lang="en-US" dirty="0"/>
           </a:p>
         </p:txBody>
       </p:sp>
@@ -3921,6 +4024,56 @@
       </p:grpSpPr>
       <p:sp>
         <p:nvSpPr>
+          <p:cNvPr id="10" name="Content Placeholder 9"/>
+          <p:cNvSpPr>
+            <a:spLocks noGrp="1"/>
+          </p:cNvSpPr>
+          <p:nvPr>
+            <p:ph sz="quarter" idx="13"/>
+          </p:nvPr>
+        </p:nvSpPr>
+        <p:spPr/>
+        <p:txBody>
+          <a:bodyPr/>
+          <a:lstStyle/>
+          <a:p>
+            <a:r>
+              <a:rPr lang="en-US" dirty="0" smtClean="0"/>
+              <a:t>Procedurally generated textures using </a:t>
+            </a:r>
+            <a:r>
+              <a:rPr lang="en-US" dirty="0" err="1" smtClean="0"/>
+              <a:t>brownian</a:t>
+            </a:r>
+            <a:r>
+              <a:rPr lang="en-US" dirty="0" smtClean="0"/>
+              <a:t> motion algorithm.</a:t>
+            </a:r>
+            <a:endParaRPr lang="en-US" dirty="0"/>
+          </a:p>
+        </p:txBody>
+      </p:sp>
+      <p:sp>
+        <p:nvSpPr>
+          <p:cNvPr id="11" name="Content Placeholder 10"/>
+          <p:cNvSpPr>
+            <a:spLocks noGrp="1"/>
+          </p:cNvSpPr>
+          <p:nvPr>
+            <p:ph sz="quarter" idx="14"/>
+          </p:nvPr>
+        </p:nvSpPr>
+        <p:spPr/>
+        <p:txBody>
+          <a:bodyPr/>
+          <a:lstStyle/>
+          <a:p>
+            <a:endParaRPr lang="en-US"/>
+          </a:p>
+        </p:txBody>
+      </p:sp>
+      <p:sp>
+        <p:nvSpPr>
           <p:cNvPr id="2" name="Title 1"/>
           <p:cNvSpPr>
             <a:spLocks noGrp="1"/>
@@ -3939,25 +4092,6 @@
               <a:t>Planet Texturing</a:t>
             </a:r>
             <a:endParaRPr lang="en-US" dirty="0"/>
-          </a:p>
-        </p:txBody>
-      </p:sp>
-      <p:sp>
-        <p:nvSpPr>
-          <p:cNvPr id="3" name="Content Placeholder 2"/>
-          <p:cNvSpPr>
-            <a:spLocks noGrp="1"/>
-          </p:cNvSpPr>
-          <p:nvPr>
-            <p:ph sz="quarter" idx="13"/>
-          </p:nvPr>
-        </p:nvSpPr>
-        <p:spPr/>
-        <p:txBody>
-          <a:bodyPr/>
-          <a:lstStyle/>
-          <a:p>
-            <a:endParaRPr lang="en-US"/>
           </a:p>
         </p:txBody>
       </p:sp>
@@ -4006,6 +4140,86 @@
           <a:bodyPr/>
           <a:lstStyle/>
           <a:p>
+            <a:endParaRPr lang="en-US"/>
+          </a:p>
+        </p:txBody>
+      </p:sp>
+      <p:sp>
+        <p:nvSpPr>
+          <p:cNvPr id="3" name="Picture Placeholder 2"/>
+          <p:cNvSpPr>
+            <a:spLocks noGrp="1"/>
+          </p:cNvSpPr>
+          <p:nvPr>
+            <p:ph type="pic" idx="1"/>
+          </p:nvPr>
+        </p:nvSpPr>
+        <p:spPr/>
+      </p:sp>
+      <p:sp>
+        <p:nvSpPr>
+          <p:cNvPr id="4" name="Text Placeholder 3"/>
+          <p:cNvSpPr>
+            <a:spLocks noGrp="1"/>
+          </p:cNvSpPr>
+          <p:nvPr>
+            <p:ph type="body" sz="half" idx="2"/>
+          </p:nvPr>
+        </p:nvSpPr>
+        <p:spPr/>
+        <p:txBody>
+          <a:bodyPr/>
+          <a:lstStyle/>
+          <a:p>
+            <a:endParaRPr lang="en-US"/>
+          </a:p>
+        </p:txBody>
+      </p:sp>
+    </p:spTree>
+    <p:extLst>
+      <p:ext uri="{BB962C8B-B14F-4D97-AF65-F5344CB8AC3E}">
+        <p14:creationId xmlns:p14="http://schemas.microsoft.com/office/powerpoint/2010/main" val="2644256613"/>
+      </p:ext>
+    </p:extLst>
+  </p:cSld>
+  <p:clrMapOvr>
+    <a:masterClrMapping/>
+  </p:clrMapOvr>
+</p:sld>
+</file>
+
+<file path=ppt/slides/slide8.xml><?xml version="1.0" encoding="utf-8"?>
+<p:sld xmlns:a="http://schemas.openxmlformats.org/drawingml/2006/main" xmlns:r="http://schemas.openxmlformats.org/officeDocument/2006/relationships" xmlns:p="http://schemas.openxmlformats.org/presentationml/2006/main">
+  <p:cSld>
+    <p:spTree>
+      <p:nvGrpSpPr>
+        <p:cNvPr id="1" name=""/>
+        <p:cNvGrpSpPr/>
+        <p:nvPr/>
+      </p:nvGrpSpPr>
+      <p:grpSpPr>
+        <a:xfrm>
+          <a:off x="0" y="0"/>
+          <a:ext cx="0" cy="0"/>
+          <a:chOff x="0" y="0"/>
+          <a:chExt cx="0" cy="0"/>
+        </a:xfrm>
+      </p:grpSpPr>
+      <p:sp>
+        <p:nvSpPr>
+          <p:cNvPr id="2" name="Title 1"/>
+          <p:cNvSpPr>
+            <a:spLocks noGrp="1"/>
+          </p:cNvSpPr>
+          <p:nvPr>
+            <p:ph type="title"/>
+          </p:nvPr>
+        </p:nvSpPr>
+        <p:spPr/>
+        <p:txBody>
+          <a:bodyPr/>
+          <a:lstStyle/>
+          <a:p>
             <a:r>
               <a:rPr lang="en-US" dirty="0" smtClean="0"/>
               <a:t>Lighting and Shading</a:t>
@@ -4029,7 +4243,7 @@
           <a:bodyPr/>
           <a:lstStyle/>
           <a:p>
-            <a:endParaRPr lang="en-US"/>
+            <a:endParaRPr lang="en-US" dirty="0"/>
           </a:p>
         </p:txBody>
       </p:sp>
@@ -4046,7 +4260,7 @@
 </p:sld>
 </file>
 
-<file path=ppt/slides/slide8.xml><?xml version="1.0" encoding="utf-8"?>
+<file path=ppt/slides/slide9.xml><?xml version="1.0" encoding="utf-8"?>
 <p:sld xmlns:a="http://schemas.openxmlformats.org/drawingml/2006/main" xmlns:r="http://schemas.openxmlformats.org/officeDocument/2006/relationships" xmlns:p="http://schemas.openxmlformats.org/presentationml/2006/main">
   <p:cSld>
     <p:spTree>

</xml_diff>